<commit_message>
back up manhattan bridge data and NJTPK work
</commit_message>
<xml_diff>
--- a/BEAST/beast_equip/revised_instrumentation.pptx
+++ b/BEAST/beast_equip/revised_instrumentation.pptx
@@ -5,12 +5,13 @@
     <p:sldMasterId id="2147483648" r:id="rId1"/>
   </p:sldMasterIdLst>
   <p:notesMasterIdLst>
-    <p:notesMasterId r:id="rId5"/>
+    <p:notesMasterId r:id="rId6"/>
   </p:notesMasterIdLst>
   <p:sldIdLst>
-    <p:sldId id="257" r:id="rId2"/>
-    <p:sldId id="258" r:id="rId3"/>
-    <p:sldId id="259" r:id="rId4"/>
+    <p:sldId id="260" r:id="rId2"/>
+    <p:sldId id="257" r:id="rId3"/>
+    <p:sldId id="258" r:id="rId4"/>
+    <p:sldId id="259" r:id="rId5"/>
   </p:sldIdLst>
   <p:sldSz cx="9144000" cy="6858000" type="screen4x3"/>
   <p:notesSz cx="6858000" cy="9144000"/>
@@ -194,7 +195,7 @@
           <a:p>
             <a:fld id="{E7487138-3B02-4719-8793-9E024F19FF63}" type="datetimeFigureOut">
               <a:rPr lang="en-US" smtClean="0"/>
-              <a:t>10/31/2018</a:t>
+              <a:t>11/30/2018</a:t>
             </a:fld>
             <a:endParaRPr lang="en-US"/>
           </a:p>
@@ -533,7 +534,7 @@
               <a:pPr>
                 <a:defRPr/>
               </a:pPr>
-              <a:t>1</a:t>
+              <a:t>2</a:t>
             </a:fld>
             <a:endParaRPr lang="en-US"/>
           </a:p>
@@ -623,7 +624,7 @@
               <a:pPr>
                 <a:defRPr/>
               </a:pPr>
-              <a:t>2</a:t>
+              <a:t>3</a:t>
             </a:fld>
             <a:endParaRPr lang="en-US"/>
           </a:p>
@@ -713,7 +714,7 @@
               <a:pPr>
                 <a:defRPr/>
               </a:pPr>
-              <a:t>3</a:t>
+              <a:t>4</a:t>
             </a:fld>
             <a:endParaRPr lang="en-US"/>
           </a:p>
@@ -913,7 +914,7 @@
           <a:p>
             <a:fld id="{97D94513-B45C-4192-B020-3B8D1EFB6DD6}" type="datetimeFigureOut">
               <a:rPr lang="en-US" smtClean="0"/>
-              <a:t>10/31/2018</a:t>
+              <a:t>11/30/2018</a:t>
             </a:fld>
             <a:endParaRPr lang="en-US"/>
           </a:p>
@@ -1083,7 +1084,7 @@
           <a:p>
             <a:fld id="{97D94513-B45C-4192-B020-3B8D1EFB6DD6}" type="datetimeFigureOut">
               <a:rPr lang="en-US" smtClean="0"/>
-              <a:t>10/31/2018</a:t>
+              <a:t>11/30/2018</a:t>
             </a:fld>
             <a:endParaRPr lang="en-US"/>
           </a:p>
@@ -1263,7 +1264,7 @@
           <a:p>
             <a:fld id="{97D94513-B45C-4192-B020-3B8D1EFB6DD6}" type="datetimeFigureOut">
               <a:rPr lang="en-US" smtClean="0"/>
-              <a:t>10/31/2018</a:t>
+              <a:t>11/30/2018</a:t>
             </a:fld>
             <a:endParaRPr lang="en-US"/>
           </a:p>
@@ -1654,7 +1655,7 @@
           <a:p>
             <a:fld id="{97D94513-B45C-4192-B020-3B8D1EFB6DD6}" type="datetimeFigureOut">
               <a:rPr lang="en-US" smtClean="0"/>
-              <a:t>10/31/2018</a:t>
+              <a:t>11/30/2018</a:t>
             </a:fld>
             <a:endParaRPr lang="en-US"/>
           </a:p>
@@ -1900,7 +1901,7 @@
           <a:p>
             <a:fld id="{97D94513-B45C-4192-B020-3B8D1EFB6DD6}" type="datetimeFigureOut">
               <a:rPr lang="en-US" smtClean="0"/>
-              <a:t>10/31/2018</a:t>
+              <a:t>11/30/2018</a:t>
             </a:fld>
             <a:endParaRPr lang="en-US"/>
           </a:p>
@@ -2188,7 +2189,7 @@
           <a:p>
             <a:fld id="{97D94513-B45C-4192-B020-3B8D1EFB6DD6}" type="datetimeFigureOut">
               <a:rPr lang="en-US" smtClean="0"/>
-              <a:t>10/31/2018</a:t>
+              <a:t>11/30/2018</a:t>
             </a:fld>
             <a:endParaRPr lang="en-US"/>
           </a:p>
@@ -2610,7 +2611,7 @@
           <a:p>
             <a:fld id="{97D94513-B45C-4192-B020-3B8D1EFB6DD6}" type="datetimeFigureOut">
               <a:rPr lang="en-US" smtClean="0"/>
-              <a:t>10/31/2018</a:t>
+              <a:t>11/30/2018</a:t>
             </a:fld>
             <a:endParaRPr lang="en-US"/>
           </a:p>
@@ -2728,7 +2729,7 @@
           <a:p>
             <a:fld id="{97D94513-B45C-4192-B020-3B8D1EFB6DD6}" type="datetimeFigureOut">
               <a:rPr lang="en-US" smtClean="0"/>
-              <a:t>10/31/2018</a:t>
+              <a:t>11/30/2018</a:t>
             </a:fld>
             <a:endParaRPr lang="en-US"/>
           </a:p>
@@ -2823,7 +2824,7 @@
           <a:p>
             <a:fld id="{97D94513-B45C-4192-B020-3B8D1EFB6DD6}" type="datetimeFigureOut">
               <a:rPr lang="en-US" smtClean="0"/>
-              <a:t>10/31/2018</a:t>
+              <a:t>11/30/2018</a:t>
             </a:fld>
             <a:endParaRPr lang="en-US"/>
           </a:p>
@@ -3100,7 +3101,7 @@
           <a:p>
             <a:fld id="{97D94513-B45C-4192-B020-3B8D1EFB6DD6}" type="datetimeFigureOut">
               <a:rPr lang="en-US" smtClean="0"/>
-              <a:t>10/31/2018</a:t>
+              <a:t>11/30/2018</a:t>
             </a:fld>
             <a:endParaRPr lang="en-US"/>
           </a:p>
@@ -3353,7 +3354,7 @@
           <a:p>
             <a:fld id="{97D94513-B45C-4192-B020-3B8D1EFB6DD6}" type="datetimeFigureOut">
               <a:rPr lang="en-US" smtClean="0"/>
-              <a:t>10/31/2018</a:t>
+              <a:t>11/30/2018</a:t>
             </a:fld>
             <a:endParaRPr lang="en-US"/>
           </a:p>
@@ -3566,7 +3567,7 @@
           <a:p>
             <a:fld id="{97D94513-B45C-4192-B020-3B8D1EFB6DD6}" type="datetimeFigureOut">
               <a:rPr lang="en-US" smtClean="0"/>
-              <a:t>10/31/2018</a:t>
+              <a:t>11/30/2018</a:t>
             </a:fld>
             <a:endParaRPr lang="en-US"/>
           </a:p>
@@ -3926,6 +3927,432 @@
 </file>
 
 <file path=ppt/slides/slide1.xml><?xml version="1.0" encoding="utf-8"?>
+<p:sld xmlns:a="http://schemas.openxmlformats.org/drawingml/2006/main" xmlns:r="http://schemas.openxmlformats.org/officeDocument/2006/relationships" xmlns:p="http://schemas.openxmlformats.org/presentationml/2006/main">
+  <p:cSld>
+    <p:spTree>
+      <p:nvGrpSpPr>
+        <p:cNvPr id="1" name=""/>
+        <p:cNvGrpSpPr/>
+        <p:nvPr/>
+      </p:nvGrpSpPr>
+      <p:grpSpPr>
+        <a:xfrm>
+          <a:off x="0" y="0"/>
+          <a:ext cx="0" cy="0"/>
+          <a:chOff x="0" y="0"/>
+          <a:chExt cx="0" cy="0"/>
+        </a:xfrm>
+      </p:grpSpPr>
+      <p:sp>
+        <p:nvSpPr>
+          <p:cNvPr id="6" name="Title 1"/>
+          <p:cNvSpPr txBox="1">
+            <a:spLocks/>
+          </p:cNvSpPr>
+          <p:nvPr/>
+        </p:nvSpPr>
+        <p:spPr>
+          <a:xfrm>
+            <a:off x="228600" y="43877"/>
+            <a:ext cx="8458200" cy="990600"/>
+          </a:xfrm>
+          <a:prstGeom prst="rect">
+            <a:avLst/>
+          </a:prstGeom>
+        </p:spPr>
+        <p:txBody>
+          <a:bodyPr/>
+          <a:lstStyle>
+            <a:lvl1pPr algn="ctr" rtl="0" eaLnBrk="0" fontAlgn="base" hangingPunct="0">
+              <a:spcBef>
+                <a:spcPct val="0"/>
+              </a:spcBef>
+              <a:spcAft>
+                <a:spcPct val="0"/>
+              </a:spcAft>
+              <a:defRPr sz="4400" kern="1200">
+                <a:solidFill>
+                  <a:schemeClr val="tx1"/>
+                </a:solidFill>
+                <a:latin typeface="Cambria" pitchFamily="18" charset="0"/>
+                <a:ea typeface="+mj-ea"/>
+                <a:cs typeface="+mj-cs"/>
+              </a:defRPr>
+            </a:lvl1pPr>
+            <a:lvl2pPr algn="ctr" rtl="0" eaLnBrk="0" fontAlgn="base" hangingPunct="0">
+              <a:spcBef>
+                <a:spcPct val="0"/>
+              </a:spcBef>
+              <a:spcAft>
+                <a:spcPct val="0"/>
+              </a:spcAft>
+              <a:defRPr sz="4400">
+                <a:solidFill>
+                  <a:schemeClr val="tx1"/>
+                </a:solidFill>
+                <a:latin typeface="Cambria" pitchFamily="18" charset="0"/>
+              </a:defRPr>
+            </a:lvl2pPr>
+            <a:lvl3pPr algn="ctr" rtl="0" eaLnBrk="0" fontAlgn="base" hangingPunct="0">
+              <a:spcBef>
+                <a:spcPct val="0"/>
+              </a:spcBef>
+              <a:spcAft>
+                <a:spcPct val="0"/>
+              </a:spcAft>
+              <a:defRPr sz="4400">
+                <a:solidFill>
+                  <a:schemeClr val="tx1"/>
+                </a:solidFill>
+                <a:latin typeface="Cambria" pitchFamily="18" charset="0"/>
+              </a:defRPr>
+            </a:lvl3pPr>
+            <a:lvl4pPr algn="ctr" rtl="0" eaLnBrk="0" fontAlgn="base" hangingPunct="0">
+              <a:spcBef>
+                <a:spcPct val="0"/>
+              </a:spcBef>
+              <a:spcAft>
+                <a:spcPct val="0"/>
+              </a:spcAft>
+              <a:defRPr sz="4400">
+                <a:solidFill>
+                  <a:schemeClr val="tx1"/>
+                </a:solidFill>
+                <a:latin typeface="Cambria" pitchFamily="18" charset="0"/>
+              </a:defRPr>
+            </a:lvl4pPr>
+            <a:lvl5pPr algn="ctr" rtl="0" eaLnBrk="0" fontAlgn="base" hangingPunct="0">
+              <a:spcBef>
+                <a:spcPct val="0"/>
+              </a:spcBef>
+              <a:spcAft>
+                <a:spcPct val="0"/>
+              </a:spcAft>
+              <a:defRPr sz="4400">
+                <a:solidFill>
+                  <a:schemeClr val="tx1"/>
+                </a:solidFill>
+                <a:latin typeface="Cambria" pitchFamily="18" charset="0"/>
+              </a:defRPr>
+            </a:lvl5pPr>
+            <a:lvl6pPr marL="457200" algn="ctr" rtl="0" fontAlgn="base">
+              <a:spcBef>
+                <a:spcPct val="0"/>
+              </a:spcBef>
+              <a:spcAft>
+                <a:spcPct val="0"/>
+              </a:spcAft>
+              <a:defRPr sz="4400">
+                <a:solidFill>
+                  <a:schemeClr val="tx1"/>
+                </a:solidFill>
+                <a:latin typeface="Cambria" pitchFamily="18" charset="0"/>
+              </a:defRPr>
+            </a:lvl6pPr>
+            <a:lvl7pPr marL="914400" algn="ctr" rtl="0" fontAlgn="base">
+              <a:spcBef>
+                <a:spcPct val="0"/>
+              </a:spcBef>
+              <a:spcAft>
+                <a:spcPct val="0"/>
+              </a:spcAft>
+              <a:defRPr sz="4400">
+                <a:solidFill>
+                  <a:schemeClr val="tx1"/>
+                </a:solidFill>
+                <a:latin typeface="Cambria" pitchFamily="18" charset="0"/>
+              </a:defRPr>
+            </a:lvl7pPr>
+            <a:lvl8pPr marL="1371600" algn="ctr" rtl="0" fontAlgn="base">
+              <a:spcBef>
+                <a:spcPct val="0"/>
+              </a:spcBef>
+              <a:spcAft>
+                <a:spcPct val="0"/>
+              </a:spcAft>
+              <a:defRPr sz="4400">
+                <a:solidFill>
+                  <a:schemeClr val="tx1"/>
+                </a:solidFill>
+                <a:latin typeface="Cambria" pitchFamily="18" charset="0"/>
+              </a:defRPr>
+            </a:lvl8pPr>
+            <a:lvl9pPr marL="1828800" algn="ctr" rtl="0" fontAlgn="base">
+              <a:spcBef>
+                <a:spcPct val="0"/>
+              </a:spcBef>
+              <a:spcAft>
+                <a:spcPct val="0"/>
+              </a:spcAft>
+              <a:defRPr sz="4400">
+                <a:solidFill>
+                  <a:schemeClr val="tx1"/>
+                </a:solidFill>
+                <a:latin typeface="Cambria" pitchFamily="18" charset="0"/>
+              </a:defRPr>
+            </a:lvl9pPr>
+          </a:lstStyle>
+          <a:p>
+            <a:pPr algn="l"/>
+            <a:r>
+              <a:rPr lang="en-US" sz="3400" dirty="0" smtClean="0">
+                <a:solidFill>
+                  <a:schemeClr val="tx1">
+                    <a:lumMod val="65000"/>
+                    <a:lumOff val="35000"/>
+                  </a:schemeClr>
+                </a:solidFill>
+                <a:latin typeface="Times New Roman" panose="02020603050405020304" pitchFamily="18" charset="0"/>
+                <a:cs typeface="Times New Roman" panose="02020603050405020304" pitchFamily="18" charset="0"/>
+              </a:rPr>
+              <a:t>Instrumentation </a:t>
+            </a:r>
+            <a:r>
+              <a:rPr lang="en-US" sz="3400" dirty="0" smtClean="0">
+                <a:solidFill>
+                  <a:schemeClr val="tx1">
+                    <a:lumMod val="65000"/>
+                    <a:lumOff val="35000"/>
+                  </a:schemeClr>
+                </a:solidFill>
+                <a:latin typeface="Times New Roman" panose="02020603050405020304" pitchFamily="18" charset="0"/>
+                <a:cs typeface="Times New Roman" panose="02020603050405020304" pitchFamily="18" charset="0"/>
+              </a:rPr>
+              <a:t>Summary</a:t>
+            </a:r>
+            <a:endParaRPr lang="en-US" sz="3400" dirty="0">
+              <a:solidFill>
+                <a:schemeClr val="tx1">
+                  <a:lumMod val="65000"/>
+                  <a:lumOff val="35000"/>
+                </a:schemeClr>
+              </a:solidFill>
+              <a:latin typeface="Times New Roman" panose="02020603050405020304" pitchFamily="18" charset="0"/>
+              <a:cs typeface="Times New Roman" panose="02020603050405020304" pitchFamily="18" charset="0"/>
+            </a:endParaRPr>
+          </a:p>
+        </p:txBody>
+      </p:sp>
+      <p:sp>
+        <p:nvSpPr>
+          <p:cNvPr id="8" name="Content Placeholder 7"/>
+          <p:cNvSpPr>
+            <a:spLocks noGrp="1"/>
+          </p:cNvSpPr>
+          <p:nvPr>
+            <p:ph idx="1"/>
+          </p:nvPr>
+        </p:nvSpPr>
+        <p:spPr>
+          <a:xfrm>
+            <a:off x="457200" y="609600"/>
+            <a:ext cx="8229600" cy="6019800"/>
+          </a:xfrm>
+        </p:spPr>
+        <p:txBody>
+          <a:bodyPr>
+            <a:normAutofit fontScale="62500" lnSpcReduction="20000"/>
+          </a:bodyPr>
+          <a:lstStyle/>
+          <a:p>
+            <a:pPr marL="0" indent="0">
+              <a:buNone/>
+            </a:pPr>
+            <a:r>
+              <a:rPr lang="en-US" dirty="0" smtClean="0"/>
+              <a:t>Deck Instrumentation</a:t>
+            </a:r>
+          </a:p>
+          <a:p>
+            <a:r>
+              <a:rPr lang="en-US" dirty="0" smtClean="0"/>
+              <a:t>(36) Rebar strain gauges</a:t>
+            </a:r>
+          </a:p>
+          <a:p>
+            <a:pPr lvl="1"/>
+            <a:r>
+              <a:rPr lang="en-US" dirty="0" smtClean="0"/>
+              <a:t>Mounted to 36” #4 sister bar, vibrating wire</a:t>
+            </a:r>
+          </a:p>
+          <a:p>
+            <a:r>
+              <a:rPr lang="en-US" dirty="0" smtClean="0"/>
+              <a:t>(4) Surface mounted strain gauges</a:t>
+            </a:r>
+          </a:p>
+          <a:p>
+            <a:pPr lvl="1"/>
+            <a:r>
+              <a:rPr lang="en-US" dirty="0" smtClean="0"/>
+              <a:t>6” gauge length with surface mounting tabs, vibrating wire</a:t>
+            </a:r>
+          </a:p>
+          <a:p>
+            <a:r>
+              <a:rPr lang="en-US" dirty="0" smtClean="0"/>
+              <a:t>(6) Embedded humidity sensors</a:t>
+            </a:r>
+          </a:p>
+          <a:p>
+            <a:pPr marL="0" indent="0">
+              <a:buNone/>
+            </a:pPr>
+            <a:r>
+              <a:rPr lang="en-US" dirty="0" smtClean="0"/>
+              <a:t>Girder Instrumentation</a:t>
+            </a:r>
+          </a:p>
+          <a:p>
+            <a:r>
+              <a:rPr lang="en-US" dirty="0" smtClean="0"/>
+              <a:t>(40) Strain gauges</a:t>
+            </a:r>
+          </a:p>
+          <a:p>
+            <a:pPr lvl="1"/>
+            <a:r>
+              <a:rPr lang="en-US" dirty="0" smtClean="0"/>
+              <a:t>2” gauge length with covers, vibrating wire</a:t>
+            </a:r>
+          </a:p>
+          <a:p>
+            <a:r>
+              <a:rPr lang="en-US" dirty="0" smtClean="0"/>
+              <a:t>(12) Displacement gauges</a:t>
+            </a:r>
+          </a:p>
+          <a:p>
+            <a:pPr lvl="1"/>
+            <a:r>
+              <a:rPr lang="en-US" dirty="0" smtClean="0"/>
+              <a:t>String potentiometers, 5” full stroke range</a:t>
+            </a:r>
+          </a:p>
+          <a:p>
+            <a:r>
+              <a:rPr lang="en-US" dirty="0" smtClean="0"/>
+              <a:t>(12) Accelerometers</a:t>
+            </a:r>
+          </a:p>
+          <a:p>
+            <a:pPr lvl="1"/>
+            <a:r>
+              <a:rPr lang="en-US" dirty="0" smtClean="0">
+                <a:sym typeface="Symbol"/>
+              </a:rPr>
+              <a:t>5G, AC coupled, piezoelectric</a:t>
+            </a:r>
+          </a:p>
+          <a:p>
+            <a:pPr marL="0" indent="0">
+              <a:buNone/>
+            </a:pPr>
+            <a:r>
+              <a:rPr lang="en-US" dirty="0" smtClean="0">
+                <a:sym typeface="Symbol"/>
+              </a:rPr>
+              <a:t>Additional Instrumentation</a:t>
+            </a:r>
+          </a:p>
+          <a:p>
+            <a:r>
+              <a:rPr lang="en-US" dirty="0" smtClean="0">
+                <a:sym typeface="Symbol"/>
+              </a:rPr>
+              <a:t> (2) joint displacement </a:t>
+            </a:r>
+          </a:p>
+          <a:p>
+            <a:pPr lvl="1"/>
+            <a:r>
+              <a:rPr lang="en-US" dirty="0" smtClean="0">
+                <a:sym typeface="Symbol"/>
+              </a:rPr>
+              <a:t>(TML gauges)</a:t>
+            </a:r>
+          </a:p>
+          <a:p>
+            <a:r>
+              <a:rPr lang="en-US" dirty="0" smtClean="0">
+                <a:sym typeface="Symbol"/>
+              </a:rPr>
+              <a:t>(16) pedestal strain</a:t>
+            </a:r>
+          </a:p>
+          <a:p>
+            <a:pPr lvl="1"/>
+            <a:r>
+              <a:rPr lang="en-US" dirty="0" smtClean="0">
+                <a:sym typeface="Symbol"/>
+              </a:rPr>
+              <a:t>2” gauge length, spot </a:t>
+            </a:r>
+            <a:r>
+              <a:rPr lang="en-US" dirty="0" err="1" smtClean="0">
+                <a:sym typeface="Symbol"/>
+              </a:rPr>
+              <a:t>weldable</a:t>
+            </a:r>
+            <a:r>
+              <a:rPr lang="en-US" dirty="0" smtClean="0">
+                <a:sym typeface="Symbol"/>
+              </a:rPr>
+              <a:t>, vibrating wire</a:t>
+            </a:r>
+          </a:p>
+          <a:p>
+            <a:r>
+              <a:rPr lang="en-US" dirty="0" smtClean="0">
+                <a:sym typeface="Symbol"/>
+              </a:rPr>
+              <a:t>(4) Reaction frame strain</a:t>
+            </a:r>
+          </a:p>
+          <a:p>
+            <a:pPr lvl="1"/>
+            <a:r>
+              <a:rPr lang="en-US" dirty="0">
+                <a:sym typeface="Symbol"/>
+              </a:rPr>
+              <a:t>2” gauge length, spot </a:t>
+            </a:r>
+            <a:r>
+              <a:rPr lang="en-US" dirty="0" err="1">
+                <a:sym typeface="Symbol"/>
+              </a:rPr>
+              <a:t>weldable</a:t>
+            </a:r>
+            <a:r>
+              <a:rPr lang="en-US" dirty="0">
+                <a:sym typeface="Symbol"/>
+              </a:rPr>
+              <a:t>, vibrating </a:t>
+            </a:r>
+            <a:r>
+              <a:rPr lang="en-US" dirty="0" smtClean="0">
+                <a:sym typeface="Symbol"/>
+              </a:rPr>
+              <a:t>wire</a:t>
+            </a:r>
+          </a:p>
+        </p:txBody>
+      </p:sp>
+    </p:spTree>
+    <p:extLst>
+      <p:ext uri="{BB962C8B-B14F-4D97-AF65-F5344CB8AC3E}">
+        <p14:creationId xmlns:p14="http://schemas.microsoft.com/office/powerpoint/2010/main" val="93508824"/>
+      </p:ext>
+    </p:extLst>
+  </p:cSld>
+  <p:clrMapOvr>
+    <a:masterClrMapping/>
+  </p:clrMapOvr>
+</p:sld>
+</file>
+
+<file path=ppt/slides/slide2.xml><?xml version="1.0" encoding="utf-8"?>
 <p:sld xmlns:a="http://schemas.openxmlformats.org/drawingml/2006/main" xmlns:r="http://schemas.openxmlformats.org/officeDocument/2006/relationships" xmlns:p="http://schemas.openxmlformats.org/presentationml/2006/main">
   <p:cSld>
     <p:spTree>
@@ -16869,7 +17296,7 @@
 </p:sld>
 </file>
 
-<file path=ppt/slides/slide2.xml><?xml version="1.0" encoding="utf-8"?>
+<file path=ppt/slides/slide3.xml><?xml version="1.0" encoding="utf-8"?>
 <p:sld xmlns:a="http://schemas.openxmlformats.org/drawingml/2006/main" xmlns:r="http://schemas.openxmlformats.org/officeDocument/2006/relationships" xmlns:p="http://schemas.openxmlformats.org/presentationml/2006/main">
   <p:cSld>
     <p:spTree>
@@ -20815,7 +21242,7 @@
 </p:sld>
 </file>
 
-<file path=ppt/slides/slide3.xml><?xml version="1.0" encoding="utf-8"?>
+<file path=ppt/slides/slide4.xml><?xml version="1.0" encoding="utf-8"?>
 <p:sld xmlns:a="http://schemas.openxmlformats.org/drawingml/2006/main" xmlns:r="http://schemas.openxmlformats.org/officeDocument/2006/relationships" xmlns:p="http://schemas.openxmlformats.org/presentationml/2006/main">
   <p:cSld>
     <p:spTree>

</xml_diff>